<commit_message>
not quite sure what changed
</commit_message>
<xml_diff>
--- a/Jenkins/Jenkins Slides.pptx
+++ b/Jenkins/Jenkins Slides.pptx
@@ -5208,11 +5208,7 @@
           <a:p>
             <a:r>
               <a:rPr lang="en-US" dirty="0" smtClean="0"/>
-              <a:t>Sainsbury</a:t>
-            </a:r>
-            <a:r>
-              <a:rPr lang="en-US" dirty="0" smtClean="0"/>
-              <a:t>’s</a:t>
+              <a:t>Sainsbury’s</a:t>
             </a:r>
           </a:p>
           <a:p>

</xml_diff>